<commit_message>
Updated pie charts, relabund.tend.cull.csv, and "Synthesis Figure_Revisions version.pptx"
</commit_message>
<xml_diff>
--- a/figures/Synthesis Figure_Revisions version.pptx
+++ b/figures/Synthesis Figure_Revisions version.pptx
@@ -249,7 +249,7 @@
           <a:p>
             <a:fld id="{FE17BAA6-2BAA-4FAA-BBCC-9D33CF1DE795}" type="datetimeFigureOut">
               <a:rPr lang="en-US" smtClean="0"/>
-              <a:t>7/14/2023</a:t>
+              <a:t>7/17/2023</a:t>
             </a:fld>
             <a:endParaRPr lang="en-US"/>
           </a:p>
@@ -419,7 +419,7 @@
           <a:p>
             <a:fld id="{FE17BAA6-2BAA-4FAA-BBCC-9D33CF1DE795}" type="datetimeFigureOut">
               <a:rPr lang="en-US" smtClean="0"/>
-              <a:t>7/14/2023</a:t>
+              <a:t>7/17/2023</a:t>
             </a:fld>
             <a:endParaRPr lang="en-US"/>
           </a:p>
@@ -599,7 +599,7 @@
           <a:p>
             <a:fld id="{FE17BAA6-2BAA-4FAA-BBCC-9D33CF1DE795}" type="datetimeFigureOut">
               <a:rPr lang="en-US" smtClean="0"/>
-              <a:t>7/14/2023</a:t>
+              <a:t>7/17/2023</a:t>
             </a:fld>
             <a:endParaRPr lang="en-US"/>
           </a:p>
@@ -769,7 +769,7 @@
           <a:p>
             <a:fld id="{FE17BAA6-2BAA-4FAA-BBCC-9D33CF1DE795}" type="datetimeFigureOut">
               <a:rPr lang="en-US" smtClean="0"/>
-              <a:t>7/14/2023</a:t>
+              <a:t>7/17/2023</a:t>
             </a:fld>
             <a:endParaRPr lang="en-US"/>
           </a:p>
@@ -1013,7 +1013,7 @@
           <a:p>
             <a:fld id="{FE17BAA6-2BAA-4FAA-BBCC-9D33CF1DE795}" type="datetimeFigureOut">
               <a:rPr lang="en-US" smtClean="0"/>
-              <a:t>7/14/2023</a:t>
+              <a:t>7/17/2023</a:t>
             </a:fld>
             <a:endParaRPr lang="en-US"/>
           </a:p>
@@ -1245,7 +1245,7 @@
           <a:p>
             <a:fld id="{FE17BAA6-2BAA-4FAA-BBCC-9D33CF1DE795}" type="datetimeFigureOut">
               <a:rPr lang="en-US" smtClean="0"/>
-              <a:t>7/14/2023</a:t>
+              <a:t>7/17/2023</a:t>
             </a:fld>
             <a:endParaRPr lang="en-US"/>
           </a:p>
@@ -1612,7 +1612,7 @@
           <a:p>
             <a:fld id="{FE17BAA6-2BAA-4FAA-BBCC-9D33CF1DE795}" type="datetimeFigureOut">
               <a:rPr lang="en-US" smtClean="0"/>
-              <a:t>7/14/2023</a:t>
+              <a:t>7/17/2023</a:t>
             </a:fld>
             <a:endParaRPr lang="en-US"/>
           </a:p>
@@ -1730,7 +1730,7 @@
           <a:p>
             <a:fld id="{FE17BAA6-2BAA-4FAA-BBCC-9D33CF1DE795}" type="datetimeFigureOut">
               <a:rPr lang="en-US" smtClean="0"/>
-              <a:t>7/14/2023</a:t>
+              <a:t>7/17/2023</a:t>
             </a:fld>
             <a:endParaRPr lang="en-US"/>
           </a:p>
@@ -1825,7 +1825,7 @@
           <a:p>
             <a:fld id="{FE17BAA6-2BAA-4FAA-BBCC-9D33CF1DE795}" type="datetimeFigureOut">
               <a:rPr lang="en-US" smtClean="0"/>
-              <a:t>7/14/2023</a:t>
+              <a:t>7/17/2023</a:t>
             </a:fld>
             <a:endParaRPr lang="en-US"/>
           </a:p>
@@ -2102,7 +2102,7 @@
           <a:p>
             <a:fld id="{FE17BAA6-2BAA-4FAA-BBCC-9D33CF1DE795}" type="datetimeFigureOut">
               <a:rPr lang="en-US" smtClean="0"/>
-              <a:t>7/14/2023</a:t>
+              <a:t>7/17/2023</a:t>
             </a:fld>
             <a:endParaRPr lang="en-US"/>
           </a:p>
@@ -2359,7 +2359,7 @@
           <a:p>
             <a:fld id="{FE17BAA6-2BAA-4FAA-BBCC-9D33CF1DE795}" type="datetimeFigureOut">
               <a:rPr lang="en-US" smtClean="0"/>
-              <a:t>7/14/2023</a:t>
+              <a:t>7/17/2023</a:t>
             </a:fld>
             <a:endParaRPr lang="en-US"/>
           </a:p>
@@ -2572,7 +2572,7 @@
           <a:p>
             <a:fld id="{FE17BAA6-2BAA-4FAA-BBCC-9D33CF1DE795}" type="datetimeFigureOut">
               <a:rPr lang="en-US" smtClean="0"/>
-              <a:t>7/14/2023</a:t>
+              <a:t>7/17/2023</a:t>
             </a:fld>
             <a:endParaRPr lang="en-US"/>
           </a:p>
@@ -2977,6 +2977,78 @@
           <a:chExt cx="0" cy="0"/>
         </a:xfrm>
       </p:grpSpPr>
+      <p:pic>
+        <p:nvPicPr>
+          <p:cNvPr id="39" name="Picture 38" descr="A colorful circle with black background&#10;&#10;Description automatically generated">
+            <a:extLst>
+              <a:ext uri="{FF2B5EF4-FFF2-40B4-BE49-F238E27FC236}">
+                <a16:creationId xmlns:a16="http://schemas.microsoft.com/office/drawing/2014/main" id="{E9A022C5-C042-E391-EE85-074CF7BE23A9}"/>
+              </a:ext>
+            </a:extLst>
+          </p:cNvPr>
+          <p:cNvPicPr>
+            <a:picLocks noChangeAspect="1"/>
+          </p:cNvPicPr>
+          <p:nvPr/>
+        </p:nvPicPr>
+        <p:blipFill>
+          <a:blip r:embed="rId2">
+            <a:extLst>
+              <a:ext uri="{28A0092B-C50C-407E-A947-70E740481C1C}">
+                <a14:useLocalDpi xmlns:a14="http://schemas.microsoft.com/office/drawing/2010/main" val="0"/>
+              </a:ext>
+            </a:extLst>
+          </a:blip>
+          <a:stretch>
+            <a:fillRect/>
+          </a:stretch>
+        </p:blipFill>
+        <p:spPr>
+          <a:xfrm>
+            <a:off x="2565428" y="7829903"/>
+            <a:ext cx="2101168" cy="2101168"/>
+          </a:xfrm>
+          <a:prstGeom prst="rect">
+            <a:avLst/>
+          </a:prstGeom>
+        </p:spPr>
+      </p:pic>
+      <p:pic>
+        <p:nvPicPr>
+          <p:cNvPr id="35" name="Content Placeholder 4" descr="A colorful circle with a black background&#10;&#10;Description automatically generated">
+            <a:extLst>
+              <a:ext uri="{FF2B5EF4-FFF2-40B4-BE49-F238E27FC236}">
+                <a16:creationId xmlns:a16="http://schemas.microsoft.com/office/drawing/2014/main" id="{0287D003-6BA7-4536-172F-37B7C576884A}"/>
+              </a:ext>
+            </a:extLst>
+          </p:cNvPr>
+          <p:cNvPicPr>
+            <a:picLocks noChangeAspect="1"/>
+          </p:cNvPicPr>
+          <p:nvPr/>
+        </p:nvPicPr>
+        <p:blipFill>
+          <a:blip r:embed="rId3">
+            <a:extLst>
+              <a:ext uri="{28A0092B-C50C-407E-A947-70E740481C1C}">
+                <a14:useLocalDpi xmlns:a14="http://schemas.microsoft.com/office/drawing/2010/main" val="0"/>
+              </a:ext>
+            </a:extLst>
+          </a:blip>
+          <a:stretch>
+            <a:fillRect/>
+          </a:stretch>
+        </p:blipFill>
+        <p:spPr>
+          <a:xfrm>
+            <a:off x="14138624" y="4288150"/>
+            <a:ext cx="5447592" cy="5447592"/>
+          </a:xfrm>
+          <a:prstGeom prst="rect">
+            <a:avLst/>
+          </a:prstGeom>
+        </p:spPr>
+      </p:pic>
       <p:grpSp>
         <p:nvGrpSpPr>
           <p:cNvPr id="23" name="Group 22">
@@ -3069,7 +3141,7 @@
             <p:nvPr/>
           </p:nvPicPr>
           <p:blipFill rotWithShape="1">
-            <a:blip r:embed="rId2"/>
+            <a:blip r:embed="rId4"/>
             <a:srcRect l="38193" t="38162" r="46460" b="54265"/>
             <a:stretch/>
           </p:blipFill>
@@ -3098,7 +3170,7 @@
             <p:nvPr/>
           </p:nvPicPr>
           <p:blipFill rotWithShape="1">
-            <a:blip r:embed="rId2"/>
+            <a:blip r:embed="rId4"/>
             <a:srcRect l="53168" t="38162" r="29986" b="54265"/>
             <a:stretch/>
           </p:blipFill>
@@ -3127,7 +3199,7 @@
             <p:nvPr/>
           </p:nvPicPr>
           <p:blipFill rotWithShape="1">
-            <a:blip r:embed="rId2"/>
+            <a:blip r:embed="rId4"/>
             <a:srcRect l="53168" t="38162" r="29986" b="54265"/>
             <a:stretch/>
           </p:blipFill>
@@ -3156,7 +3228,7 @@
             <p:nvPr/>
           </p:nvPicPr>
           <p:blipFill rotWithShape="1">
-            <a:blip r:embed="rId2"/>
+            <a:blip r:embed="rId4"/>
             <a:srcRect l="38193" t="38162" r="46460" b="54265"/>
             <a:stretch/>
           </p:blipFill>
@@ -4053,78 +4125,6 @@
             </a:p>
           </p:txBody>
         </p:sp>
-        <p:pic>
-          <p:nvPicPr>
-            <p:cNvPr id="4" name="Picture 3" descr="Chart, pie chart&#10;&#10;Description automatically generated">
-              <a:extLst>
-                <a:ext uri="{FF2B5EF4-FFF2-40B4-BE49-F238E27FC236}">
-                  <a16:creationId xmlns:a16="http://schemas.microsoft.com/office/drawing/2014/main" id="{D32B8314-54B5-FA8E-8EF9-CF5168512B80}"/>
-                </a:ext>
-              </a:extLst>
-            </p:cNvPr>
-            <p:cNvPicPr>
-              <a:picLocks noChangeAspect="1"/>
-            </p:cNvPicPr>
-            <p:nvPr/>
-          </p:nvPicPr>
-          <p:blipFill>
-            <a:blip r:embed="rId3">
-              <a:extLst>
-                <a:ext uri="{28A0092B-C50C-407E-A947-70E740481C1C}">
-                  <a14:useLocalDpi xmlns:a14="http://schemas.microsoft.com/office/drawing/2010/main" val="0"/>
-                </a:ext>
-              </a:extLst>
-            </a:blip>
-            <a:stretch>
-              <a:fillRect/>
-            </a:stretch>
-          </p:blipFill>
-          <p:spPr>
-            <a:xfrm>
-              <a:off x="1866181" y="4335720"/>
-              <a:ext cx="2101168" cy="2101168"/>
-            </a:xfrm>
-            <a:prstGeom prst="rect">
-              <a:avLst/>
-            </a:prstGeom>
-          </p:spPr>
-        </p:pic>
-        <p:pic>
-          <p:nvPicPr>
-            <p:cNvPr id="215" name="Picture 214" descr="Chart, pie chart&#10;&#10;Description automatically generated">
-              <a:extLst>
-                <a:ext uri="{FF2B5EF4-FFF2-40B4-BE49-F238E27FC236}">
-                  <a16:creationId xmlns:a16="http://schemas.microsoft.com/office/drawing/2014/main" id="{3C454881-AAB9-82B4-175C-064785FABF8B}"/>
-                </a:ext>
-              </a:extLst>
-            </p:cNvPr>
-            <p:cNvPicPr>
-              <a:picLocks noChangeAspect="1"/>
-            </p:cNvPicPr>
-            <p:nvPr/>
-          </p:nvPicPr>
-          <p:blipFill>
-            <a:blip r:embed="rId4">
-              <a:extLst>
-                <a:ext uri="{28A0092B-C50C-407E-A947-70E740481C1C}">
-                  <a14:useLocalDpi xmlns:a14="http://schemas.microsoft.com/office/drawing/2010/main" val="0"/>
-                </a:ext>
-              </a:extLst>
-            </a:blip>
-            <a:stretch>
-              <a:fillRect/>
-            </a:stretch>
-          </p:blipFill>
-          <p:spPr>
-            <a:xfrm>
-              <a:off x="13445479" y="798017"/>
-              <a:ext cx="5420708" cy="5420708"/>
-            </a:xfrm>
-            <a:prstGeom prst="rect">
-              <a:avLst/>
-            </a:prstGeom>
-          </p:spPr>
-        </p:pic>
         <p:pic>
           <p:nvPicPr>
             <p:cNvPr id="6" name="Picture 5" descr="Chart, pie chart&#10;&#10;Description automatically generated">
@@ -6053,6 +6053,110 @@
           </a:ln>
         </p:spPr>
       </p:pic>
+      <p:sp>
+        <p:nvSpPr>
+          <p:cNvPr id="37" name="Rectangle 36">
+            <a:extLst>
+              <a:ext uri="{FF2B5EF4-FFF2-40B4-BE49-F238E27FC236}">
+                <a16:creationId xmlns:a16="http://schemas.microsoft.com/office/drawing/2014/main" id="{0D7AA161-83C1-A0F0-F45C-0DB98836E3CC}"/>
+              </a:ext>
+            </a:extLst>
+          </p:cNvPr>
+          <p:cNvSpPr/>
+          <p:nvPr/>
+        </p:nvSpPr>
+        <p:spPr>
+          <a:xfrm>
+            <a:off x="16367539" y="6610676"/>
+            <a:ext cx="484065" cy="420084"/>
+          </a:xfrm>
+          <a:prstGeom prst="rect">
+            <a:avLst/>
+          </a:prstGeom>
+          <a:solidFill>
+            <a:srgbClr val="FFD700"/>
+          </a:solidFill>
+          <a:ln>
+            <a:noFill/>
+          </a:ln>
+        </p:spPr>
+        <p:style>
+          <a:lnRef idx="2">
+            <a:schemeClr val="accent1">
+              <a:shade val="15000"/>
+            </a:schemeClr>
+          </a:lnRef>
+          <a:fillRef idx="1">
+            <a:schemeClr val="accent1"/>
+          </a:fillRef>
+          <a:effectRef idx="0">
+            <a:schemeClr val="accent1"/>
+          </a:effectRef>
+          <a:fontRef idx="minor">
+            <a:schemeClr val="lt1"/>
+          </a:fontRef>
+        </p:style>
+        <p:txBody>
+          <a:bodyPr rtlCol="0" anchor="ctr"/>
+          <a:lstStyle/>
+          <a:p>
+            <a:pPr algn="ctr"/>
+            <a:endParaRPr lang="en-US" dirty="0"/>
+          </a:p>
+        </p:txBody>
+      </p:sp>
+      <p:sp>
+        <p:nvSpPr>
+          <p:cNvPr id="42" name="Rectangle 41">
+            <a:extLst>
+              <a:ext uri="{FF2B5EF4-FFF2-40B4-BE49-F238E27FC236}">
+                <a16:creationId xmlns:a16="http://schemas.microsoft.com/office/drawing/2014/main" id="{0E6CD853-911C-D8F0-6B98-CEBE3A560A7F}"/>
+              </a:ext>
+            </a:extLst>
+          </p:cNvPr>
+          <p:cNvSpPr/>
+          <p:nvPr/>
+        </p:nvSpPr>
+        <p:spPr>
+          <a:xfrm rot="20891455">
+            <a:off x="3505359" y="8738521"/>
+            <a:ext cx="93959" cy="148746"/>
+          </a:xfrm>
+          <a:prstGeom prst="rect">
+            <a:avLst/>
+          </a:prstGeom>
+          <a:solidFill>
+            <a:srgbClr val="FFD700"/>
+          </a:solidFill>
+          <a:ln>
+            <a:noFill/>
+          </a:ln>
+        </p:spPr>
+        <p:style>
+          <a:lnRef idx="2">
+            <a:schemeClr val="accent1">
+              <a:shade val="15000"/>
+            </a:schemeClr>
+          </a:lnRef>
+          <a:fillRef idx="1">
+            <a:schemeClr val="accent1"/>
+          </a:fillRef>
+          <a:effectRef idx="0">
+            <a:schemeClr val="accent1"/>
+          </a:effectRef>
+          <a:fontRef idx="minor">
+            <a:schemeClr val="lt1"/>
+          </a:fontRef>
+        </p:style>
+        <p:txBody>
+          <a:bodyPr rtlCol="0" anchor="ctr"/>
+          <a:lstStyle/>
+          <a:p>
+            <a:pPr algn="ctr"/>
+            <a:endParaRPr lang="en-US" dirty="0"/>
+          </a:p>
+        </p:txBody>
+      </p:sp>
     </p:spTree>
     <p:extLst>
       <p:ext uri="{BB962C8B-B14F-4D97-AF65-F5344CB8AC3E}">

</xml_diff>